<commit_message>
Update Aymeric Beck Antoine Buirey Tanguy Horard.pptx
</commit_message>
<xml_diff>
--- a/Aymeric Beck Antoine Buirey Tanguy Horard.pptx
+++ b/Aymeric Beck Antoine Buirey Tanguy Horard.pptx
@@ -5,12 +5,13 @@
     <p:sldMasterId id="2147483648" r:id="rId1"/>
   </p:sldMasterIdLst>
   <p:notesMasterIdLst>
-    <p:notesMasterId r:id="rId5"/>
+    <p:notesMasterId r:id="rId6"/>
   </p:notesMasterIdLst>
   <p:sldIdLst>
     <p:sldId id="256" r:id="rId2"/>
     <p:sldId id="257" r:id="rId3"/>
     <p:sldId id="258" r:id="rId4"/>
+    <p:sldId id="259" r:id="rId5"/>
   </p:sldIdLst>
   <p:sldSz cx="12192000" cy="6858000"/>
   <p:notesSz cx="6858000" cy="9144000"/>
@@ -109,6 +110,11 @@
       </a:defRPr>
     </a:lvl9pPr>
   </p:defaultTextStyle>
+  <p:extLst>
+    <p:ext uri="{EFAFB233-063F-42B5-8137-9DF3F51BA10A}">
+      <p15:sldGuideLst xmlns:p15="http://schemas.microsoft.com/office/powerpoint/2012/main"/>
+    </p:ext>
+  </p:extLst>
 </p:presentation>
 </file>
 
@@ -4880,6 +4886,14 @@
 <file path=ppt/slides/slide3.xml><?xml version="1.0" encoding="utf-8"?>
 <p:sld xmlns:a="http://schemas.openxmlformats.org/drawingml/2006/main" xmlns:r="http://schemas.openxmlformats.org/officeDocument/2006/relationships" xmlns:p="http://schemas.openxmlformats.org/presentationml/2006/main">
   <p:cSld>
+    <p:bg>
+      <p:bgPr>
+        <a:solidFill>
+          <a:schemeClr val="bg1"/>
+        </a:solidFill>
+        <a:effectLst/>
+      </p:bgPr>
+    </p:bg>
     <p:spTree>
       <p:nvGrpSpPr>
         <p:cNvPr id="1" name=""/>
@@ -4896,6 +4910,106 @@
       </p:grpSpPr>
       <p:sp>
         <p:nvSpPr>
+          <p:cNvPr id="13" name="Rectangle 10">
+            <a:extLst>
+              <a:ext uri="{FF2B5EF4-FFF2-40B4-BE49-F238E27FC236}">
+                <a16:creationId xmlns:a16="http://schemas.microsoft.com/office/drawing/2014/main" id="{ADF2AA3E-C714-4E8D-9F46-9E6FFF7FBA36}"/>
+              </a:ext>
+              <a:ext uri="{C183D7F6-B498-43B3-948B-1728B52AA6E4}">
+                <adec:decorative xmlns:adec="http://schemas.microsoft.com/office/drawing/2017/decorative" val="1"/>
+              </a:ext>
+            </a:extLst>
+          </p:cNvPr>
+          <p:cNvSpPr>
+            <a:spLocks noGrp="1" noRot="1" noChangeAspect="1" noMove="1" noResize="1" noEditPoints="1" noAdjustHandles="1" noChangeArrowheads="1" noChangeShapeType="1" noTextEdit="1"/>
+          </p:cNvSpPr>
+          <p:nvPr>
+            <p:extLst>
+              <p:ext uri="{386F3935-93C4-4BCD-93E2-E3B085C9AB24}">
+                <p16:designElem xmlns:p16="http://schemas.microsoft.com/office/powerpoint/2015/main" val="1"/>
+              </p:ext>
+            </p:extLst>
+          </p:nvPr>
+        </p:nvSpPr>
+        <p:spPr bwMode="ltGray">
+          <a:xfrm>
+            <a:off x="393308" y="338328"/>
+            <a:ext cx="11438793" cy="1577725"/>
+          </a:xfrm>
+          <a:prstGeom prst="rect">
+            <a:avLst/>
+          </a:prstGeom>
+          <a:solidFill>
+            <a:schemeClr val="tx1">
+              <a:lumMod val="75000"/>
+              <a:lumOff val="25000"/>
+            </a:schemeClr>
+          </a:solidFill>
+          <a:ln w="127000" cap="sq" cmpd="thinThick">
+            <a:solidFill>
+              <a:schemeClr val="tx1">
+                <a:lumMod val="75000"/>
+                <a:lumOff val="25000"/>
+              </a:schemeClr>
+            </a:solidFill>
+          </a:ln>
+        </p:spPr>
+        <p:style>
+          <a:lnRef idx="2">
+            <a:schemeClr val="accent1">
+              <a:shade val="50000"/>
+            </a:schemeClr>
+          </a:lnRef>
+          <a:fillRef idx="1">
+            <a:schemeClr val="accent1"/>
+          </a:fillRef>
+          <a:effectRef idx="0">
+            <a:schemeClr val="accent1"/>
+          </a:effectRef>
+          <a:fontRef idx="minor">
+            <a:schemeClr val="lt1"/>
+          </a:fontRef>
+        </p:style>
+        <p:txBody>
+          <a:bodyPr rtlCol="0" anchor="ctr"/>
+          <a:lstStyle/>
+          <a:p>
+            <a:pPr marL="0" marR="0" lvl="0" indent="0" algn="ctr" defTabSz="914400" rtl="0" eaLnBrk="1" fontAlgn="auto" latinLnBrk="0" hangingPunct="1">
+              <a:lnSpc>
+                <a:spcPct val="100000"/>
+              </a:lnSpc>
+              <a:spcBef>
+                <a:spcPts val="0"/>
+              </a:spcBef>
+              <a:spcAft>
+                <a:spcPts val="0"/>
+              </a:spcAft>
+              <a:buClrTx/>
+              <a:buSzTx/>
+              <a:buFontTx/>
+              <a:buNone/>
+              <a:tabLst/>
+              <a:defRPr/>
+            </a:pPr>
+            <a:endParaRPr kumimoji="0" lang="en-US" sz="1800" b="0" i="0" u="none" strike="noStrike" kern="1200" cap="none" spc="0" normalizeH="0" baseline="0" noProof="0">
+              <a:ln>
+                <a:noFill/>
+              </a:ln>
+              <a:solidFill>
+                <a:prstClr val="white"/>
+              </a:solidFill>
+              <a:effectLst/>
+              <a:uLnTx/>
+              <a:uFillTx/>
+              <a:latin typeface="Calibri" panose="020F0502020204030204"/>
+              <a:ea typeface="+mn-ea"/>
+              <a:cs typeface="+mn-cs"/>
+            </a:endParaRPr>
+          </a:p>
+        </p:txBody>
+      </p:sp>
+      <p:sp>
+        <p:nvSpPr>
           <p:cNvPr id="2" name="Titre 1">
             <a:extLst>
               <a:ext uri="{FF2B5EF4-FFF2-40B4-BE49-F238E27FC236}">
@@ -4910,15 +5024,129 @@
             <p:ph type="title"/>
           </p:nvPr>
         </p:nvSpPr>
-        <p:spPr/>
-        <p:txBody>
-          <a:bodyPr/>
-          <a:lstStyle/>
-          <a:p>
-            <a:r>
-              <a:rPr lang="fr-FR" dirty="0"/>
+        <p:spPr>
+          <a:xfrm>
+            <a:off x="838200" y="467541"/>
+            <a:ext cx="10515600" cy="1325563"/>
+          </a:xfrm>
+        </p:spPr>
+        <p:txBody>
+          <a:bodyPr>
+            <a:normAutofit/>
+          </a:bodyPr>
+          <a:lstStyle/>
+          <a:p>
+            <a:r>
+              <a:rPr lang="fr-FR">
+                <a:solidFill>
+                  <a:schemeClr val="bg1"/>
+                </a:solidFill>
+              </a:rPr>
               <a:t>Le temps passé par tâche par personne</a:t>
             </a:r>
+          </a:p>
+        </p:txBody>
+      </p:sp>
+      <p:sp>
+        <p:nvSpPr>
+          <p:cNvPr id="4" name="Espace réservé du pied de page 3">
+            <a:extLst>
+              <a:ext uri="{FF2B5EF4-FFF2-40B4-BE49-F238E27FC236}">
+                <a16:creationId xmlns:a16="http://schemas.microsoft.com/office/drawing/2014/main" id="{3011EB7F-7B3C-8223-BD90-A08CD5953EB7}"/>
+              </a:ext>
+            </a:extLst>
+          </p:cNvPr>
+          <p:cNvSpPr>
+            <a:spLocks noGrp="1"/>
+          </p:cNvSpPr>
+          <p:nvPr>
+            <p:ph type="ftr" sz="quarter" idx="11"/>
+          </p:nvPr>
+        </p:nvSpPr>
+        <p:spPr>
+          <a:xfrm>
+            <a:off x="4038600" y="6356350"/>
+            <a:ext cx="4114800" cy="365125"/>
+          </a:xfrm>
+        </p:spPr>
+        <p:txBody>
+          <a:bodyPr>
+            <a:normAutofit/>
+          </a:bodyPr>
+          <a:lstStyle/>
+          <a:p>
+            <a:pPr>
+              <a:spcAft>
+                <a:spcPts val="600"/>
+              </a:spcAft>
+            </a:pPr>
+            <a:r>
+              <a:rPr lang="en-US">
+                <a:solidFill>
+                  <a:srgbClr val="898989"/>
+                </a:solidFill>
+              </a:rPr>
+              <a:t>Aymeric Beck, Antoine Buirey, Tanguy Horard</a:t>
+            </a:r>
+            <a:endParaRPr lang="fr-FR">
+              <a:solidFill>
+                <a:srgbClr val="898989"/>
+              </a:solidFill>
+            </a:endParaRPr>
+          </a:p>
+        </p:txBody>
+      </p:sp>
+      <p:sp>
+        <p:nvSpPr>
+          <p:cNvPr id="5" name="Espace réservé du numéro de diapositive 4">
+            <a:extLst>
+              <a:ext uri="{FF2B5EF4-FFF2-40B4-BE49-F238E27FC236}">
+                <a16:creationId xmlns:a16="http://schemas.microsoft.com/office/drawing/2014/main" id="{16B822C2-28A6-F6E0-3357-6600E094D6E6}"/>
+              </a:ext>
+            </a:extLst>
+          </p:cNvPr>
+          <p:cNvSpPr>
+            <a:spLocks noGrp="1"/>
+          </p:cNvSpPr>
+          <p:nvPr>
+            <p:ph type="sldNum" sz="quarter" idx="12"/>
+          </p:nvPr>
+        </p:nvSpPr>
+        <p:spPr>
+          <a:xfrm>
+            <a:off x="8610600" y="6356350"/>
+            <a:ext cx="2743200" cy="365125"/>
+          </a:xfrm>
+        </p:spPr>
+        <p:txBody>
+          <a:bodyPr>
+            <a:normAutofit/>
+          </a:bodyPr>
+          <a:lstStyle/>
+          <a:p>
+            <a:pPr>
+              <a:spcAft>
+                <a:spcPts val="600"/>
+              </a:spcAft>
+            </a:pPr>
+            <a:fld id="{E97370F3-AA7C-4DAF-B65C-4EE554D7E146}" type="slidenum">
+              <a:rPr lang="fr-FR">
+                <a:solidFill>
+                  <a:srgbClr val="898989"/>
+                </a:solidFill>
+              </a:rPr>
+              <a:pPr>
+                <a:spcAft>
+                  <a:spcPts val="600"/>
+                </a:spcAft>
+              </a:pPr>
+              <a:t>3</a:t>
+            </a:fld>
+            <a:endParaRPr lang="fr-FR">
+              <a:solidFill>
+                <a:srgbClr val="898989"/>
+              </a:solidFill>
+            </a:endParaRPr>
           </a:p>
         </p:txBody>
       </p:sp>
@@ -4938,14 +5166,14 @@
             <p:ph idx="1"/>
             <p:extLst>
               <p:ext uri="{D42A27DB-BD31-4B8C-83A1-F6EECF244321}">
-                <p14:modId xmlns:p14="http://schemas.microsoft.com/office/powerpoint/2010/main" val="3005519888"/>
+                <p14:modId xmlns:p14="http://schemas.microsoft.com/office/powerpoint/2010/main" val="822013257"/>
               </p:ext>
             </p:extLst>
           </p:nvPr>
         </p:nvGraphicFramePr>
         <p:xfrm>
-          <a:off x="838200" y="1825625"/>
-          <a:ext cx="10515600" cy="3403600"/>
+          <a:off x="838200" y="2417515"/>
+          <a:ext cx="10515601" cy="3667415"/>
         </p:xfrm>
         <a:graphic>
           <a:graphicData uri="http://schemas.openxmlformats.org/drawingml/2006/table">
@@ -4954,28 +5182,28 @@
                 <a:tableStyleId>{5C22544A-7EE6-4342-B048-85BDC9FD1C3A}</a:tableStyleId>
               </a:tblPr>
               <a:tblGrid>
-                <a:gridCol w="2628900">
+                <a:gridCol w="2649197">
                   <a:extLst>
                     <a:ext uri="{9D8B030D-6E8A-4147-A177-3AD203B41FA5}">
                       <a16:colId xmlns:a16="http://schemas.microsoft.com/office/drawing/2014/main" val="1173355300"/>
                     </a:ext>
                   </a:extLst>
                 </a:gridCol>
-                <a:gridCol w="2628900">
+                <a:gridCol w="2568010">
                   <a:extLst>
                     <a:ext uri="{9D8B030D-6E8A-4147-A177-3AD203B41FA5}">
                       <a16:colId xmlns:a16="http://schemas.microsoft.com/office/drawing/2014/main" val="1840359330"/>
                     </a:ext>
                   </a:extLst>
                 </a:gridCol>
-                <a:gridCol w="2628900">
+                <a:gridCol w="2649197">
                   <a:extLst>
                     <a:ext uri="{9D8B030D-6E8A-4147-A177-3AD203B41FA5}">
                       <a16:colId xmlns:a16="http://schemas.microsoft.com/office/drawing/2014/main" val="2485657318"/>
                     </a:ext>
                   </a:extLst>
                 </a:gridCol>
-                <a:gridCol w="2628900">
+                <a:gridCol w="2649197">
                   <a:extLst>
                     <a:ext uri="{9D8B030D-6E8A-4147-A177-3AD203B41FA5}">
                       <a16:colId xmlns:a16="http://schemas.microsoft.com/office/drawing/2014/main" val="3900884781"/>
@@ -4983,16 +5211,16 @@
                   </a:extLst>
                 </a:gridCol>
               </a:tblGrid>
-              <a:tr h="370840">
+              <a:tr h="405443">
                 <a:tc>
                   <a:txBody>
                     <a:bodyPr/>
                     <a:lstStyle/>
                     <a:p>
-                      <a:endParaRPr lang="fr-FR" dirty="0"/>
+                      <a:endParaRPr lang="fr-FR" sz="1800"/>
                     </a:p>
                   </a:txBody>
-                  <a:tcPr/>
+                  <a:tcPr marL="92146" marR="92146" marT="46073" marB="46073"/>
                 </a:tc>
                 <a:tc>
                   <a:txBody>
@@ -5000,12 +5228,12 @@
                     <a:lstStyle/>
                     <a:p>
                       <a:r>
-                        <a:rPr lang="fr-FR" dirty="0"/>
+                        <a:rPr lang="fr-FR" sz="1800"/>
                         <a:t>Aymeric Beck</a:t>
                       </a:r>
                     </a:p>
                   </a:txBody>
-                  <a:tcPr/>
+                  <a:tcPr marL="92146" marR="92146" marT="46073" marB="46073"/>
                 </a:tc>
                 <a:tc>
                   <a:txBody>
@@ -5013,12 +5241,12 @@
                     <a:lstStyle/>
                     <a:p>
                       <a:r>
-                        <a:rPr lang="fr-FR" dirty="0"/>
+                        <a:rPr lang="fr-FR" sz="1800"/>
                         <a:t>Antoine Buirey</a:t>
                       </a:r>
                     </a:p>
                   </a:txBody>
-                  <a:tcPr/>
+                  <a:tcPr marL="92146" marR="92146" marT="46073" marB="46073"/>
                 </a:tc>
                 <a:tc>
                   <a:txBody>
@@ -5026,17 +5254,12 @@
                     <a:lstStyle/>
                     <a:p>
                       <a:r>
-                        <a:rPr lang="fr-FR" dirty="0"/>
-                        <a:t>Tanguy </a:t>
+                        <a:rPr lang="fr-FR" sz="1800"/>
+                        <a:t>Tanguy Horard</a:t>
                       </a:r>
-                      <a:r>
-                        <a:rPr lang="fr-FR" dirty="0" err="1"/>
-                        <a:t>Horard</a:t>
-                      </a:r>
-                      <a:endParaRPr lang="fr-FR" dirty="0"/>
                     </a:p>
                   </a:txBody>
-                  <a:tcPr/>
+                  <a:tcPr marL="92146" marR="92146" marT="46073" marB="46073"/>
                 </a:tc>
                 <a:extLst>
                   <a:ext uri="{0D108BD9-81ED-4DB2-BD59-A6C34878D82A}">
@@ -5044,49 +5267,49 @@
                   </a:ext>
                 </a:extLst>
               </a:tr>
-              <a:tr h="370840">
+              <a:tr h="405443">
                 <a:tc>
                   <a:txBody>
                     <a:bodyPr/>
                     <a:lstStyle/>
                     <a:p>
                       <a:r>
-                        <a:rPr lang="fr-FR" dirty="0"/>
+                        <a:rPr lang="fr-FR" sz="1800"/>
                         <a:t>R1.11 - Flyer</a:t>
                       </a:r>
                     </a:p>
                   </a:txBody>
-                  <a:tcPr/>
+                  <a:tcPr marL="92146" marR="92146" marT="46073" marB="46073"/>
                 </a:tc>
                 <a:tc>
                   <a:txBody>
                     <a:bodyPr/>
                     <a:lstStyle/>
                     <a:p>
-                      <a:endParaRPr lang="fr-FR" dirty="0"/>
+                      <a:endParaRPr lang="fr-FR" sz="1800"/>
                     </a:p>
                   </a:txBody>
-                  <a:tcPr/>
+                  <a:tcPr marL="92146" marR="92146" marT="46073" marB="46073"/>
                 </a:tc>
                 <a:tc>
                   <a:txBody>
                     <a:bodyPr/>
                     <a:lstStyle/>
                     <a:p>
-                      <a:endParaRPr lang="fr-FR" dirty="0"/>
+                      <a:endParaRPr lang="fr-FR" sz="1800"/>
                     </a:p>
                   </a:txBody>
-                  <a:tcPr/>
+                  <a:tcPr marL="92146" marR="92146" marT="46073" marB="46073"/>
                 </a:tc>
                 <a:tc>
                   <a:txBody>
                     <a:bodyPr/>
                     <a:lstStyle/>
                     <a:p>
-                      <a:endParaRPr lang="fr-FR"/>
+                      <a:endParaRPr lang="fr-FR" sz="1800"/>
                     </a:p>
                   </a:txBody>
-                  <a:tcPr/>
+                  <a:tcPr marL="92146" marR="92146" marT="46073" marB="46073"/>
                 </a:tc>
                 <a:extLst>
                   <a:ext uri="{0D108BD9-81ED-4DB2-BD59-A6C34878D82A}">
@@ -5094,49 +5317,49 @@
                   </a:ext>
                 </a:extLst>
               </a:tr>
-              <a:tr h="370840">
+              <a:tr h="405443">
                 <a:tc>
                   <a:txBody>
                     <a:bodyPr/>
                     <a:lstStyle/>
                     <a:p>
                       <a:r>
-                        <a:rPr lang="fr-FR" dirty="0"/>
+                        <a:rPr lang="fr-FR" sz="1800"/>
                         <a:t>R1.11 - Note d’intention</a:t>
                       </a:r>
                     </a:p>
                   </a:txBody>
-                  <a:tcPr/>
+                  <a:tcPr marL="92146" marR="92146" marT="46073" marB="46073"/>
                 </a:tc>
                 <a:tc>
                   <a:txBody>
                     <a:bodyPr/>
                     <a:lstStyle/>
                     <a:p>
-                      <a:endParaRPr lang="fr-FR"/>
+                      <a:endParaRPr lang="fr-FR" sz="1800"/>
                     </a:p>
                   </a:txBody>
-                  <a:tcPr/>
+                  <a:tcPr marL="92146" marR="92146" marT="46073" marB="46073"/>
                 </a:tc>
                 <a:tc>
                   <a:txBody>
                     <a:bodyPr/>
                     <a:lstStyle/>
                     <a:p>
-                      <a:endParaRPr lang="fr-FR" dirty="0"/>
+                      <a:endParaRPr lang="fr-FR" sz="1800"/>
                     </a:p>
                   </a:txBody>
-                  <a:tcPr/>
+                  <a:tcPr marL="92146" marR="92146" marT="46073" marB="46073"/>
                 </a:tc>
                 <a:tc>
                   <a:txBody>
                     <a:bodyPr/>
                     <a:lstStyle/>
                     <a:p>
-                      <a:endParaRPr lang="fr-FR"/>
+                      <a:endParaRPr lang="fr-FR" sz="1800"/>
                     </a:p>
                   </a:txBody>
-                  <a:tcPr/>
+                  <a:tcPr marL="92146" marR="92146" marT="46073" marB="46073"/>
                 </a:tc>
                 <a:extLst>
                   <a:ext uri="{0D108BD9-81ED-4DB2-BD59-A6C34878D82A}">
@@ -5144,29 +5367,29 @@
                   </a:ext>
                 </a:extLst>
               </a:tr>
-              <a:tr h="370840">
+              <a:tr h="681881">
                 <a:tc>
                   <a:txBody>
                     <a:bodyPr/>
                     <a:lstStyle/>
                     <a:p>
                       <a:r>
-                        <a:rPr lang="fr-FR" dirty="0"/>
+                        <a:rPr lang="fr-FR" sz="1800"/>
                         <a:t>R1.08 - Diagramme des tâches</a:t>
                       </a:r>
                     </a:p>
                   </a:txBody>
-                  <a:tcPr/>
+                  <a:tcPr marL="92146" marR="92146" marT="46073" marB="46073"/>
                 </a:tc>
                 <a:tc>
                   <a:txBody>
                     <a:bodyPr/>
                     <a:lstStyle/>
                     <a:p>
-                      <a:endParaRPr lang="fr-FR"/>
+                      <a:endParaRPr lang="fr-FR" sz="1800"/>
                     </a:p>
                   </a:txBody>
-                  <a:tcPr/>
+                  <a:tcPr marL="92146" marR="92146" marT="46073" marB="46073"/>
                 </a:tc>
                 <a:tc>
                   <a:txBody>
@@ -5174,22 +5397,22 @@
                     <a:lstStyle/>
                     <a:p>
                       <a:r>
-                        <a:rPr lang="fr-FR" dirty="0"/>
+                        <a:rPr lang="fr-FR" sz="1800"/>
                         <a:t>2h</a:t>
                       </a:r>
                     </a:p>
                   </a:txBody>
-                  <a:tcPr/>
+                  <a:tcPr marL="92146" marR="92146" marT="46073" marB="46073"/>
                 </a:tc>
                 <a:tc>
                   <a:txBody>
                     <a:bodyPr/>
                     <a:lstStyle/>
                     <a:p>
-                      <a:endParaRPr lang="fr-FR"/>
+                      <a:endParaRPr lang="fr-FR" sz="1800"/>
                     </a:p>
                   </a:txBody>
-                  <a:tcPr/>
+                  <a:tcPr marL="92146" marR="92146" marT="46073" marB="46073"/>
                 </a:tc>
                 <a:extLst>
                   <a:ext uri="{0D108BD9-81ED-4DB2-BD59-A6C34878D82A}">
@@ -5197,49 +5420,49 @@
                   </a:ext>
                 </a:extLst>
               </a:tr>
-              <a:tr h="370840">
+              <a:tr h="405443">
                 <a:tc>
                   <a:txBody>
                     <a:bodyPr/>
                     <a:lstStyle/>
                     <a:p>
                       <a:r>
-                        <a:rPr lang="fr-FR" dirty="0"/>
+                        <a:rPr lang="fr-FR" sz="1800"/>
                         <a:t>R1.08 - Note explicative</a:t>
                       </a:r>
                     </a:p>
                   </a:txBody>
-                  <a:tcPr/>
+                  <a:tcPr marL="92146" marR="92146" marT="46073" marB="46073"/>
                 </a:tc>
                 <a:tc>
                   <a:txBody>
                     <a:bodyPr/>
                     <a:lstStyle/>
                     <a:p>
-                      <a:endParaRPr lang="fr-FR"/>
+                      <a:endParaRPr lang="fr-FR" sz="1800"/>
                     </a:p>
                   </a:txBody>
-                  <a:tcPr/>
+                  <a:tcPr marL="92146" marR="92146" marT="46073" marB="46073"/>
                 </a:tc>
                 <a:tc>
                   <a:txBody>
                     <a:bodyPr/>
                     <a:lstStyle/>
                     <a:p>
-                      <a:endParaRPr lang="fr-FR" dirty="0"/>
+                      <a:endParaRPr lang="fr-FR" sz="1800"/>
                     </a:p>
                   </a:txBody>
-                  <a:tcPr/>
+                  <a:tcPr marL="92146" marR="92146" marT="46073" marB="46073"/>
                 </a:tc>
                 <a:tc>
                   <a:txBody>
                     <a:bodyPr/>
                     <a:lstStyle/>
                     <a:p>
-                      <a:endParaRPr lang="fr-FR"/>
+                      <a:endParaRPr lang="fr-FR" sz="1800"/>
                     </a:p>
                   </a:txBody>
-                  <a:tcPr/>
+                  <a:tcPr marL="92146" marR="92146" marT="46073" marB="46073"/>
                 </a:tc>
                 <a:extLst>
                   <a:ext uri="{0D108BD9-81ED-4DB2-BD59-A6C34878D82A}">
@@ -5247,29 +5470,29 @@
                   </a:ext>
                 </a:extLst>
               </a:tr>
-              <a:tr h="370840">
+              <a:tr h="681881">
                 <a:tc>
                   <a:txBody>
                     <a:bodyPr/>
                     <a:lstStyle/>
                     <a:p>
                       <a:r>
-                        <a:rPr lang="fr-FR" dirty="0"/>
+                        <a:rPr lang="fr-FR" sz="1800"/>
                         <a:t>R1.08 - Présentation PowerPoint</a:t>
                       </a:r>
                     </a:p>
                   </a:txBody>
-                  <a:tcPr/>
+                  <a:tcPr marL="92146" marR="92146" marT="46073" marB="46073"/>
                 </a:tc>
                 <a:tc>
                   <a:txBody>
                     <a:bodyPr/>
                     <a:lstStyle/>
                     <a:p>
-                      <a:endParaRPr lang="fr-FR"/>
+                      <a:endParaRPr lang="fr-FR" sz="1800"/>
                     </a:p>
                   </a:txBody>
-                  <a:tcPr/>
+                  <a:tcPr marL="92146" marR="92146" marT="46073" marB="46073"/>
                 </a:tc>
                 <a:tc>
                   <a:txBody>
@@ -5277,22 +5500,22 @@
                     <a:lstStyle/>
                     <a:p>
                       <a:r>
-                        <a:rPr lang="fr-FR" dirty="0"/>
+                        <a:rPr lang="fr-FR" sz="1800"/>
                         <a:t>1H30</a:t>
                       </a:r>
                     </a:p>
                   </a:txBody>
-                  <a:tcPr/>
+                  <a:tcPr marL="92146" marR="92146" marT="46073" marB="46073"/>
                 </a:tc>
                 <a:tc>
                   <a:txBody>
                     <a:bodyPr/>
                     <a:lstStyle/>
                     <a:p>
-                      <a:endParaRPr lang="fr-FR"/>
+                      <a:endParaRPr lang="fr-FR" sz="1800"/>
                     </a:p>
                   </a:txBody>
-                  <a:tcPr/>
+                  <a:tcPr marL="92146" marR="92146" marT="46073" marB="46073"/>
                 </a:tc>
                 <a:extLst>
                   <a:ext uri="{0D108BD9-81ED-4DB2-BD59-A6C34878D82A}">
@@ -5300,29 +5523,29 @@
                   </a:ext>
                 </a:extLst>
               </a:tr>
-              <a:tr h="370840">
+              <a:tr h="681881">
                 <a:tc>
                   <a:txBody>
                     <a:bodyPr/>
                     <a:lstStyle/>
                     <a:p>
                       <a:r>
-                        <a:rPr lang="fr-FR" dirty="0"/>
+                        <a:rPr lang="fr-FR" sz="1800"/>
                         <a:t>R1.02 - Site de présentation du BUT</a:t>
                       </a:r>
                     </a:p>
                   </a:txBody>
-                  <a:tcPr/>
+                  <a:tcPr marL="92146" marR="92146" marT="46073" marB="46073"/>
                 </a:tc>
                 <a:tc>
                   <a:txBody>
                     <a:bodyPr/>
                     <a:lstStyle/>
                     <a:p>
-                      <a:endParaRPr lang="fr-FR"/>
+                      <a:endParaRPr lang="fr-FR" sz="1800"/>
                     </a:p>
                   </a:txBody>
-                  <a:tcPr/>
+                  <a:tcPr marL="92146" marR="92146" marT="46073" marB="46073"/>
                 </a:tc>
                 <a:tc>
                   <a:txBody>
@@ -5330,22 +5553,22 @@
                     <a:lstStyle/>
                     <a:p>
                       <a:r>
-                        <a:rPr lang="fr-FR" dirty="0"/>
+                        <a:rPr lang="fr-FR" sz="1800"/>
                         <a:t>4H</a:t>
                       </a:r>
                     </a:p>
                   </a:txBody>
-                  <a:tcPr/>
+                  <a:tcPr marL="92146" marR="92146" marT="46073" marB="46073"/>
                 </a:tc>
                 <a:tc>
                   <a:txBody>
                     <a:bodyPr/>
                     <a:lstStyle/>
                     <a:p>
-                      <a:endParaRPr lang="fr-FR" dirty="0"/>
+                      <a:endParaRPr lang="fr-FR" sz="1800"/>
                     </a:p>
                   </a:txBody>
-                  <a:tcPr/>
+                  <a:tcPr marL="92146" marR="92146" marT="46073" marB="46073"/>
                 </a:tc>
                 <a:extLst>
                   <a:ext uri="{0D108BD9-81ED-4DB2-BD59-A6C34878D82A}">
@@ -5357,68 +5580,378 @@
           </a:graphicData>
         </a:graphic>
       </p:graphicFrame>
-      <p:sp>
-        <p:nvSpPr>
-          <p:cNvPr id="4" name="Espace réservé du pied de page 3">
-            <a:extLst>
-              <a:ext uri="{FF2B5EF4-FFF2-40B4-BE49-F238E27FC236}">
-                <a16:creationId xmlns:a16="http://schemas.microsoft.com/office/drawing/2014/main" id="{3011EB7F-7B3C-8223-BD90-A08CD5953EB7}"/>
-              </a:ext>
-            </a:extLst>
-          </p:cNvPr>
-          <p:cNvSpPr>
-            <a:spLocks noGrp="1"/>
-          </p:cNvSpPr>
-          <p:nvPr>
-            <p:ph type="ftr" sz="quarter" idx="11"/>
-          </p:nvPr>
-        </p:nvSpPr>
-        <p:spPr/>
-        <p:txBody>
-          <a:bodyPr/>
-          <a:lstStyle/>
-          <a:p>
-            <a:r>
-              <a:rPr lang="en-US"/>
-              <a:t>Aymeric Beck, Antoine Buirey, Tanguy Horard</a:t>
-            </a:r>
-            <a:endParaRPr lang="fr-FR"/>
-          </a:p>
-        </p:txBody>
-      </p:sp>
-      <p:sp>
-        <p:nvSpPr>
-          <p:cNvPr id="5" name="Espace réservé du numéro de diapositive 4">
-            <a:extLst>
-              <a:ext uri="{FF2B5EF4-FFF2-40B4-BE49-F238E27FC236}">
-                <a16:creationId xmlns:a16="http://schemas.microsoft.com/office/drawing/2014/main" id="{16B822C2-28A6-F6E0-3357-6600E094D6E6}"/>
-              </a:ext>
-            </a:extLst>
-          </p:cNvPr>
-          <p:cNvSpPr>
-            <a:spLocks noGrp="1"/>
-          </p:cNvSpPr>
-          <p:nvPr>
-            <p:ph type="sldNum" sz="quarter" idx="12"/>
-          </p:nvPr>
-        </p:nvSpPr>
-        <p:spPr/>
-        <p:txBody>
-          <a:bodyPr/>
-          <a:lstStyle/>
-          <a:p>
-            <a:fld id="{E97370F3-AA7C-4DAF-B65C-4EE554D7E146}" type="slidenum">
-              <a:rPr lang="fr-FR" smtClean="0"/>
-              <a:t>3</a:t>
-            </a:fld>
-            <a:endParaRPr lang="fr-FR"/>
-          </a:p>
-        </p:txBody>
-      </p:sp>
     </p:spTree>
     <p:extLst>
       <p:ext uri="{BB962C8B-B14F-4D97-AF65-F5344CB8AC3E}">
         <p14:creationId xmlns:p14="http://schemas.microsoft.com/office/powerpoint/2010/main" val="2257177902"/>
+      </p:ext>
+    </p:extLst>
+  </p:cSld>
+  <p:clrMapOvr>
+    <a:masterClrMapping/>
+  </p:clrMapOvr>
+</p:sld>
+</file>
+
+<file path=ppt/slides/slide4.xml><?xml version="1.0" encoding="utf-8"?>
+<p:sld xmlns:a="http://schemas.openxmlformats.org/drawingml/2006/main" xmlns:r="http://schemas.openxmlformats.org/officeDocument/2006/relationships" xmlns:p="http://schemas.openxmlformats.org/presentationml/2006/main">
+  <p:cSld>
+    <p:bg>
+      <p:bgPr>
+        <a:solidFill>
+          <a:schemeClr val="bg1"/>
+        </a:solidFill>
+        <a:effectLst/>
+      </p:bgPr>
+    </p:bg>
+    <p:spTree>
+      <p:nvGrpSpPr>
+        <p:cNvPr id="1" name=""/>
+        <p:cNvGrpSpPr/>
+        <p:nvPr/>
+      </p:nvGrpSpPr>
+      <p:grpSpPr>
+        <a:xfrm>
+          <a:off x="0" y="0"/>
+          <a:ext cx="0" cy="0"/>
+          <a:chOff x="0" y="0"/>
+          <a:chExt cx="0" cy="0"/>
+        </a:xfrm>
+      </p:grpSpPr>
+      <p:sp>
+        <p:nvSpPr>
+          <p:cNvPr id="10" name="Rectangle 9">
+            <a:extLst>
+              <a:ext uri="{FF2B5EF4-FFF2-40B4-BE49-F238E27FC236}">
+                <a16:creationId xmlns:a16="http://schemas.microsoft.com/office/drawing/2014/main" id="{488333BA-AE6E-427A-9B16-A39C8073F4EB}"/>
+              </a:ext>
+              <a:ext uri="{C183D7F6-B498-43B3-948B-1728B52AA6E4}">
+                <adec:decorative xmlns:adec="http://schemas.microsoft.com/office/drawing/2017/decorative" val="1"/>
+              </a:ext>
+            </a:extLst>
+          </p:cNvPr>
+          <p:cNvSpPr>
+            <a:spLocks noGrp="1" noRot="1" noChangeAspect="1" noMove="1" noResize="1" noEditPoints="1" noAdjustHandles="1" noChangeArrowheads="1" noChangeShapeType="1" noTextEdit="1"/>
+          </p:cNvSpPr>
+          <p:nvPr>
+            <p:extLst>
+              <p:ext uri="{386F3935-93C4-4BCD-93E2-E3B085C9AB24}">
+                <p16:designElem xmlns:p16="http://schemas.microsoft.com/office/powerpoint/2015/main" val="1"/>
+              </p:ext>
+            </p:extLst>
+          </p:nvPr>
+        </p:nvSpPr>
+        <p:spPr>
+          <a:xfrm>
+            <a:off x="0" y="0"/>
+            <a:ext cx="12188952" cy="6858000"/>
+          </a:xfrm>
+          <a:prstGeom prst="rect">
+            <a:avLst/>
+          </a:prstGeom>
+          <a:solidFill>
+            <a:schemeClr val="tx1">
+              <a:lumMod val="75000"/>
+              <a:lumOff val="25000"/>
+            </a:schemeClr>
+          </a:solidFill>
+          <a:ln>
+            <a:noFill/>
+          </a:ln>
+        </p:spPr>
+        <p:style>
+          <a:lnRef idx="2">
+            <a:schemeClr val="accent1">
+              <a:shade val="50000"/>
+            </a:schemeClr>
+          </a:lnRef>
+          <a:fillRef idx="1">
+            <a:schemeClr val="accent1"/>
+          </a:fillRef>
+          <a:effectRef idx="0">
+            <a:schemeClr val="accent1"/>
+          </a:effectRef>
+          <a:fontRef idx="minor">
+            <a:schemeClr val="lt1"/>
+          </a:fontRef>
+        </p:style>
+        <p:txBody>
+          <a:bodyPr rtlCol="0" anchor="ctr"/>
+          <a:lstStyle/>
+          <a:p>
+            <a:pPr algn="ctr"/>
+            <a:endParaRPr lang="en-US"/>
+          </a:p>
+        </p:txBody>
+      </p:sp>
+      <p:sp>
+        <p:nvSpPr>
+          <p:cNvPr id="12" name="Rectangle 11">
+            <a:extLst>
+              <a:ext uri="{FF2B5EF4-FFF2-40B4-BE49-F238E27FC236}">
+                <a16:creationId xmlns:a16="http://schemas.microsoft.com/office/drawing/2014/main" id="{F98ED85F-DCEE-4B50-802E-71A6E3E12B04}"/>
+              </a:ext>
+              <a:ext uri="{C183D7F6-B498-43B3-948B-1728B52AA6E4}">
+                <adec:decorative xmlns:adec="http://schemas.microsoft.com/office/drawing/2017/decorative" val="1"/>
+              </a:ext>
+            </a:extLst>
+          </p:cNvPr>
+          <p:cNvSpPr>
+            <a:spLocks noGrp="1" noRot="1" noChangeAspect="1" noMove="1" noResize="1" noEditPoints="1" noAdjustHandles="1" noChangeArrowheads="1" noChangeShapeType="1" noTextEdit="1"/>
+          </p:cNvSpPr>
+          <p:nvPr>
+            <p:extLst>
+              <p:ext uri="{386F3935-93C4-4BCD-93E2-E3B085C9AB24}">
+                <p16:designElem xmlns:p16="http://schemas.microsoft.com/office/powerpoint/2015/main" val="1"/>
+              </p:ext>
+            </p:extLst>
+          </p:nvPr>
+        </p:nvSpPr>
+        <p:spPr bwMode="ltGray">
+          <a:xfrm>
+            <a:off x="321564" y="320040"/>
+            <a:ext cx="11548872" cy="6217920"/>
+          </a:xfrm>
+          <a:prstGeom prst="rect">
+            <a:avLst/>
+          </a:prstGeom>
+          <a:solidFill>
+            <a:schemeClr val="bg1"/>
+          </a:solidFill>
+          <a:ln w="127000" cap="sq" cmpd="thinThick">
+            <a:solidFill>
+              <a:schemeClr val="bg1"/>
+            </a:solidFill>
+          </a:ln>
+        </p:spPr>
+        <p:style>
+          <a:lnRef idx="2">
+            <a:schemeClr val="accent1">
+              <a:shade val="50000"/>
+            </a:schemeClr>
+          </a:lnRef>
+          <a:fillRef idx="1">
+            <a:schemeClr val="accent1"/>
+          </a:fillRef>
+          <a:effectRef idx="0">
+            <a:schemeClr val="accent1"/>
+          </a:effectRef>
+          <a:fontRef idx="minor">
+            <a:schemeClr val="lt1"/>
+          </a:fontRef>
+        </p:style>
+        <p:txBody>
+          <a:bodyPr rtlCol="0" anchor="ctr"/>
+          <a:lstStyle/>
+          <a:p>
+            <a:pPr algn="ctr"/>
+            <a:endParaRPr lang="en-US"/>
+          </a:p>
+        </p:txBody>
+      </p:sp>
+      <p:sp>
+        <p:nvSpPr>
+          <p:cNvPr id="2" name="Titre 1">
+            <a:extLst>
+              <a:ext uri="{FF2B5EF4-FFF2-40B4-BE49-F238E27FC236}">
+                <a16:creationId xmlns:a16="http://schemas.microsoft.com/office/drawing/2014/main" id="{02801C38-4A43-8F20-9086-1386B7D5249B}"/>
+              </a:ext>
+            </a:extLst>
+          </p:cNvPr>
+          <p:cNvSpPr>
+            <a:spLocks noGrp="1"/>
+          </p:cNvSpPr>
+          <p:nvPr>
+            <p:ph type="title"/>
+          </p:nvPr>
+        </p:nvSpPr>
+        <p:spPr>
+          <a:xfrm>
+            <a:off x="838200" y="631825"/>
+            <a:ext cx="10515600" cy="1325563"/>
+          </a:xfrm>
+        </p:spPr>
+        <p:txBody>
+          <a:bodyPr>
+            <a:normAutofit/>
+          </a:bodyPr>
+          <a:lstStyle/>
+          <a:p>
+            <a:r>
+              <a:rPr lang="fr-FR" dirty="0"/>
+              <a:t>La Note explicative</a:t>
+            </a:r>
+          </a:p>
+        </p:txBody>
+      </p:sp>
+      <p:sp>
+        <p:nvSpPr>
+          <p:cNvPr id="3" name="Espace réservé du contenu 2">
+            <a:extLst>
+              <a:ext uri="{FF2B5EF4-FFF2-40B4-BE49-F238E27FC236}">
+                <a16:creationId xmlns:a16="http://schemas.microsoft.com/office/drawing/2014/main" id="{CCA5D217-C75C-2144-AD2A-C8611EB3D0A5}"/>
+              </a:ext>
+            </a:extLst>
+          </p:cNvPr>
+          <p:cNvSpPr>
+            <a:spLocks noGrp="1"/>
+          </p:cNvSpPr>
+          <p:nvPr>
+            <p:ph idx="1"/>
+          </p:nvPr>
+        </p:nvSpPr>
+        <p:spPr>
+          <a:xfrm>
+            <a:off x="838200" y="2057400"/>
+            <a:ext cx="10515600" cy="3871762"/>
+          </a:xfrm>
+        </p:spPr>
+        <p:txBody>
+          <a:bodyPr>
+            <a:normAutofit fontScale="92500" lnSpcReduction="10000"/>
+          </a:bodyPr>
+          <a:lstStyle/>
+          <a:p>
+            <a:pPr marL="0" indent="0" algn="just">
+              <a:lnSpc>
+                <a:spcPct val="107000"/>
+              </a:lnSpc>
+              <a:spcAft>
+                <a:spcPts val="800"/>
+              </a:spcAft>
+              <a:buNone/>
+            </a:pPr>
+            <a:r>
+              <a:rPr lang="fr-FR" sz="1800" dirty="0">
+                <a:effectLst/>
+                <a:latin typeface="Calibri" panose="020F0502020204030204" pitchFamily="34" charset="0"/>
+                <a:ea typeface="Calibri" panose="020F0502020204030204" pitchFamily="34" charset="0"/>
+                <a:cs typeface="Times New Roman" panose="02020603050405020304" pitchFamily="18" charset="0"/>
+              </a:rPr>
+              <a:t>Pour le contenu du site, toutes les indications étaient données dans le sujet (présenter les SAE, présenter les compétences, faire un glossaire, …). Un morceau de la structure nous était également fourni à savoir faire un menu pour naviguer facilement à travers les différentes rubriques. D’autres choses étaient imposées tels que le responsive design dont on reparlera ainsi que la conformité aux standards du W3C. pour l’aspect graphique, nous avons voulu rester très sobre sans fioriture inutile qui aurait pu amoindrir la compréhension générale du site déjà chargé en information mais également pour rester le plus fidèle à la charte graphique de l’IUT d’Aix-Marseille. Pour les choix techniques, nous avons décidé d’utiliser le Framework bootstrap afin d’avoir une bonne gestion de la mise en page du site et de facilité la mise en place du responsive design. Nous avons également fait le choix d’utiliser un fichier CSS supplémentaire pour des modifications qui n’étaient pas disponible via les classes de bootstrap ou qui étaient trop compliqué à mettre en place. Dans cette SAE, nous n’avons eu que deux problèmes, mais ce sont des problèmes majeur e quelque sorte. Le premier qui a mis presque une semaine à être résolu concerne bootstrap en lui-même. Nous avions la mauvaise version de bootstrap installé (version 4 installé au lieu de la version 5). De ce fait, tous ce que nous faisions ne marchait pas car ce n’était évidemment pas la bonne version. Le second problème majeur concerne cette fois ci le responsive design. En effet notre menu, réalisé grâce aux classes navbar de bootstrap, disparaissait lors du rétrécissement de l’écran et c’est notamment une des raisons pour laquelle nous avons utilisé un fichier CSS tierce. </a:t>
+            </a:r>
+          </a:p>
+        </p:txBody>
+      </p:sp>
+      <p:sp>
+        <p:nvSpPr>
+          <p:cNvPr id="4" name="Espace réservé du pied de page 3">
+            <a:extLst>
+              <a:ext uri="{FF2B5EF4-FFF2-40B4-BE49-F238E27FC236}">
+                <a16:creationId xmlns:a16="http://schemas.microsoft.com/office/drawing/2014/main" id="{6B5E5D94-0798-7348-0D5C-E6DAA42AEF48}"/>
+              </a:ext>
+            </a:extLst>
+          </p:cNvPr>
+          <p:cNvSpPr>
+            <a:spLocks noGrp="1"/>
+          </p:cNvSpPr>
+          <p:nvPr>
+            <p:ph type="ftr" sz="quarter" idx="11"/>
+          </p:nvPr>
+        </p:nvSpPr>
+        <p:spPr>
+          <a:xfrm>
+            <a:off x="4038600" y="6077585"/>
+            <a:ext cx="4114800" cy="365125"/>
+          </a:xfrm>
+        </p:spPr>
+        <p:txBody>
+          <a:bodyPr>
+            <a:normAutofit/>
+          </a:bodyPr>
+          <a:lstStyle/>
+          <a:p>
+            <a:pPr>
+              <a:spcAft>
+                <a:spcPts val="600"/>
+              </a:spcAft>
+            </a:pPr>
+            <a:r>
+              <a:rPr lang="en-US">
+                <a:solidFill>
+                  <a:schemeClr val="tx1">
+                    <a:lumMod val="75000"/>
+                    <a:lumOff val="25000"/>
+                  </a:schemeClr>
+                </a:solidFill>
+              </a:rPr>
+              <a:t>Aymeric Beck, Antoine Buirey, Tanguy Horard</a:t>
+            </a:r>
+            <a:endParaRPr lang="fr-FR">
+              <a:solidFill>
+                <a:schemeClr val="tx1">
+                  <a:lumMod val="75000"/>
+                  <a:lumOff val="25000"/>
+                </a:schemeClr>
+              </a:solidFill>
+            </a:endParaRPr>
+          </a:p>
+        </p:txBody>
+      </p:sp>
+      <p:sp>
+        <p:nvSpPr>
+          <p:cNvPr id="5" name="Espace réservé du numéro de diapositive 4">
+            <a:extLst>
+              <a:ext uri="{FF2B5EF4-FFF2-40B4-BE49-F238E27FC236}">
+                <a16:creationId xmlns:a16="http://schemas.microsoft.com/office/drawing/2014/main" id="{1BFF5AE7-092F-38ED-E7FE-CB54D8BD1A74}"/>
+              </a:ext>
+            </a:extLst>
+          </p:cNvPr>
+          <p:cNvSpPr>
+            <a:spLocks noGrp="1"/>
+          </p:cNvSpPr>
+          <p:nvPr>
+            <p:ph type="sldNum" sz="quarter" idx="12"/>
+          </p:nvPr>
+        </p:nvSpPr>
+        <p:spPr>
+          <a:xfrm>
+            <a:off x="8610600" y="6077585"/>
+            <a:ext cx="2743200" cy="365125"/>
+          </a:xfrm>
+        </p:spPr>
+        <p:txBody>
+          <a:bodyPr>
+            <a:normAutofit/>
+          </a:bodyPr>
+          <a:lstStyle/>
+          <a:p>
+            <a:pPr>
+              <a:spcAft>
+                <a:spcPts val="600"/>
+              </a:spcAft>
+            </a:pPr>
+            <a:fld id="{E97370F3-AA7C-4DAF-B65C-4EE554D7E146}" type="slidenum">
+              <a:rPr lang="fr-FR">
+                <a:solidFill>
+                  <a:schemeClr val="tx1">
+                    <a:lumMod val="75000"/>
+                    <a:lumOff val="25000"/>
+                  </a:schemeClr>
+                </a:solidFill>
+              </a:rPr>
+              <a:pPr>
+                <a:spcAft>
+                  <a:spcPts val="600"/>
+                </a:spcAft>
+              </a:pPr>
+              <a:t>4</a:t>
+            </a:fld>
+            <a:endParaRPr lang="fr-FR">
+              <a:solidFill>
+                <a:schemeClr val="tx1">
+                  <a:lumMod val="75000"/>
+                  <a:lumOff val="25000"/>
+                </a:schemeClr>
+              </a:solidFill>
+            </a:endParaRPr>
+          </a:p>
+        </p:txBody>
+      </p:sp>
+    </p:spTree>
+    <p:extLst>
+      <p:ext uri="{BB962C8B-B14F-4D97-AF65-F5344CB8AC3E}">
+        <p14:creationId xmlns:p14="http://schemas.microsoft.com/office/powerpoint/2010/main" val="2606538270"/>
       </p:ext>
     </p:extLst>
   </p:cSld>

</xml_diff>